<commit_message>
final draft of poster to review
</commit_message>
<xml_diff>
--- a/project/ML Poster.pptx
+++ b/project/ML Poster.pptx
@@ -3159,7 +3159,7 @@
         </p:nvSpPr>
         <p:spPr>
           <a:xfrm>
-            <a:off x="1280160" y="28669725"/>
+            <a:off x="1280160" y="28971654"/>
             <a:ext cx="2498352" cy="746346"/>
           </a:xfrm>
           <a:prstGeom prst="rect">
@@ -4081,7 +4081,7 @@
         </p:nvSpPr>
         <p:spPr>
           <a:xfrm>
-            <a:off x="1280160" y="10972800"/>
+            <a:off x="1280160" y="10820400"/>
             <a:ext cx="9692640" cy="685800"/>
           </a:xfrm>
           <a:prstGeom prst="rect">
@@ -4147,8 +4147,8 @@
         </p:nvSpPr>
         <p:spPr bwMode="auto">
           <a:xfrm>
-            <a:off x="21994999" y="23834037"/>
-            <a:ext cx="9692640" cy="3293163"/>
+            <a:off x="22021800" y="22265627"/>
+            <a:ext cx="9692640" cy="6309373"/>
           </a:xfrm>
           <a:prstGeom prst="rect">
             <a:avLst/>
@@ -4270,10 +4270,22 @@
           <a:p>
             <a:pPr eaLnBrk="1" hangingPunct="1"/>
             <a:r>
+              <a:rPr lang="en-US" sz="2800" dirty="0" smtClean="0">
+                <a:latin typeface="Calibri" pitchFamily="34" charset="0"/>
+              </a:rPr>
+              <a:t>The team was able to flesh out </a:t>
+            </a:r>
+            <a:r>
               <a:rPr lang="en-US" sz="2800" dirty="0">
                 <a:latin typeface="Calibri" pitchFamily="34" charset="0"/>
               </a:rPr>
-              <a:t>Click here to insert your Discussion text. Type it in or copy and paste from your Word document or other source.</a:t>
+              <a:t>a solid </a:t>
+            </a:r>
+            <a:r>
+              <a:rPr lang="en-US" sz="2800" dirty="0" smtClean="0">
+                <a:latin typeface="Calibri" pitchFamily="34" charset="0"/>
+              </a:rPr>
+              <a:t>model, with low error rates. This model can easily be built upon to include more data sources, such as twitter and SEC data. </a:t>
             </a:r>
           </a:p>
           <a:p>
@@ -4285,26 +4297,98 @@
           <a:p>
             <a:pPr eaLnBrk="1" hangingPunct="1"/>
             <a:r>
+              <a:rPr lang="en-US" sz="2800" dirty="0" smtClean="0">
+                <a:latin typeface="Calibri" pitchFamily="34" charset="0"/>
+              </a:rPr>
+              <a:t>One of </a:t>
+            </a:r>
+            <a:r>
               <a:rPr lang="en-US" sz="2800" dirty="0">
                 <a:latin typeface="Calibri" pitchFamily="34" charset="0"/>
               </a:rPr>
-              <a:t>This text box will automatically re-size to your text. To turn off that feature, right click inside this box and go to </a:t>
-            </a:r>
-            <a:r>
-              <a:rPr lang="en-US" sz="2800" b="1" dirty="0">
-                <a:latin typeface="Calibri" pitchFamily="34" charset="0"/>
-              </a:rPr>
-              <a:t>Format Shape, Text Box, Autofit</a:t>
+              <a:t>the biggest challenges </a:t>
+            </a:r>
+            <a:r>
+              <a:rPr lang="en-US" sz="2800" dirty="0" smtClean="0">
+                <a:latin typeface="Calibri" pitchFamily="34" charset="0"/>
+              </a:rPr>
+              <a:t>was getting </a:t>
             </a:r>
             <a:r>
               <a:rPr lang="en-US" sz="2800" dirty="0">
                 <a:latin typeface="Calibri" pitchFamily="34" charset="0"/>
               </a:rPr>
-              <a:t>, and select the “Do Not Autofit” radio button.</a:t>
-            </a:r>
-          </a:p>
-          <a:p>
-            <a:pPr eaLnBrk="1" hangingPunct="1"/>
+              <a:t>enough clean data from a variety of sources. Despite our best efforts, there were often significant gaps in dates between published articles</a:t>
+            </a:r>
+            <a:r>
+              <a:rPr lang="en-US" sz="2800" dirty="0" smtClean="0">
+                <a:latin typeface="Calibri" pitchFamily="34" charset="0"/>
+              </a:rPr>
+              <a:t>.</a:t>
+            </a:r>
+          </a:p>
+          <a:p>
+            <a:pPr eaLnBrk="1" hangingPunct="1"/>
+            <a:endParaRPr lang="en-US" sz="2800" dirty="0">
+              <a:latin typeface="Calibri" pitchFamily="34" charset="0"/>
+            </a:endParaRPr>
+          </a:p>
+          <a:p>
+            <a:pPr eaLnBrk="1" hangingPunct="1"/>
+            <a:r>
+              <a:rPr lang="en-US" sz="2800" dirty="0" smtClean="0">
+                <a:latin typeface="Calibri" pitchFamily="34" charset="0"/>
+              </a:rPr>
+              <a:t>RNN’s </a:t>
+            </a:r>
+            <a:r>
+              <a:rPr lang="en-US" sz="2800" dirty="0">
+                <a:latin typeface="Calibri" pitchFamily="34" charset="0"/>
+              </a:rPr>
+              <a:t>are potentially a great tool for stock predictions, but they </a:t>
+            </a:r>
+            <a:r>
+              <a:rPr lang="en-US" sz="2800" dirty="0" smtClean="0">
+                <a:latin typeface="Calibri" pitchFamily="34" charset="0"/>
+              </a:rPr>
+              <a:t>require a large amount of </a:t>
+            </a:r>
+            <a:r>
+              <a:rPr lang="en-US" sz="2800" dirty="0">
+                <a:latin typeface="Calibri" pitchFamily="34" charset="0"/>
+              </a:rPr>
+              <a:t>data </a:t>
+            </a:r>
+            <a:r>
+              <a:rPr lang="en-US" sz="2800" dirty="0" smtClean="0">
+                <a:latin typeface="Calibri" pitchFamily="34" charset="0"/>
+              </a:rPr>
+              <a:t>to achieve maximum potential. In a low data situation, a generative model is one of the best choices. However</a:t>
+            </a:r>
+            <a:r>
+              <a:rPr lang="en-US" sz="2800" dirty="0">
+                <a:latin typeface="Calibri" pitchFamily="34" charset="0"/>
+              </a:rPr>
+              <a:t>, as more data is collected and the gaps are filled, the RNN </a:t>
+            </a:r>
+            <a:r>
+              <a:rPr lang="en-US" sz="2800" dirty="0" smtClean="0">
+                <a:latin typeface="Calibri" pitchFamily="34" charset="0"/>
+              </a:rPr>
+              <a:t>will continue </a:t>
+            </a:r>
+            <a:r>
+              <a:rPr lang="en-US" sz="2800" dirty="0">
+                <a:latin typeface="Calibri" pitchFamily="34" charset="0"/>
+              </a:rPr>
+              <a:t>to improve and eventually outperform a generative model</a:t>
+            </a:r>
+            <a:r>
+              <a:rPr lang="en-US" sz="2800" dirty="0" smtClean="0">
+                <a:latin typeface="Calibri" pitchFamily="34" charset="0"/>
+              </a:rPr>
+              <a:t>. </a:t>
+            </a:r>
             <a:endParaRPr lang="en-US" sz="2800" dirty="0">
               <a:latin typeface="Calibri" pitchFamily="34" charset="0"/>
             </a:endParaRPr>
@@ -4319,7 +4403,7 @@
         </p:nvSpPr>
         <p:spPr>
           <a:xfrm>
-            <a:off x="21994999" y="23148237"/>
+            <a:off x="22021800" y="21579827"/>
             <a:ext cx="9692640" cy="685800"/>
           </a:xfrm>
           <a:prstGeom prst="rect">
@@ -4362,7 +4446,7 @@
                   </a:schemeClr>
                 </a:solidFill>
               </a:rPr>
-              <a:t>Conclusions</a:t>
+              <a:t>Conclusions and Discussion</a:t>
             </a:r>
             <a:endParaRPr lang="en-US" sz="4400" b="1" dirty="0">
               <a:solidFill>
@@ -4386,7 +4470,7 @@
         <p:spPr bwMode="auto">
           <a:xfrm>
             <a:off x="22019558" y="5486400"/>
-            <a:ext cx="9692640" cy="16219778"/>
+            <a:ext cx="9692640" cy="15788891"/>
           </a:xfrm>
           <a:prstGeom prst="rect">
             <a:avLst/>
@@ -4511,12 +4595,24 @@
               <a:rPr lang="en-US" sz="2800" dirty="0">
                 <a:latin typeface="Calibri" pitchFamily="34" charset="0"/>
               </a:rPr>
-              <a:t>The RNN model, a NN model that adapts to and “remembers” previous data, was the main model to test our hypothesis. This model used current features, such as raw text data, </a:t>
+              <a:t>The RNN model, a NN model that adapts to and “remembers” previous data, </a:t>
             </a:r>
             <a:r>
               <a:rPr lang="en-US" sz="2800" dirty="0" smtClean="0">
                 <a:latin typeface="Calibri" pitchFamily="34" charset="0"/>
               </a:rPr>
+              <a:t>used </a:t>
+            </a:r>
+            <a:r>
+              <a:rPr lang="en-US" sz="2800" dirty="0">
+                <a:latin typeface="Calibri" pitchFamily="34" charset="0"/>
+              </a:rPr>
+              <a:t>current features, such as raw text data, </a:t>
+            </a:r>
+            <a:r>
+              <a:rPr lang="en-US" sz="2800" dirty="0" smtClean="0">
+                <a:latin typeface="Calibri" pitchFamily="34" charset="0"/>
+              </a:rPr>
               <a:t>25 classes </a:t>
             </a:r>
             <a:r>
@@ -4525,12 +4621,21 @@
               </a:rPr>
               <a:t>generated by topic modeling, and google trends to ultimately predict the closing stock price.  </a:t>
             </a:r>
+          </a:p>
+          <a:p>
+            <a:pPr eaLnBrk="1" hangingPunct="1"/>
             <a:endParaRPr lang="en-US" sz="2800" dirty="0" smtClean="0">
               <a:latin typeface="Calibri" pitchFamily="34" charset="0"/>
             </a:endParaRPr>
           </a:p>
           <a:p>
             <a:pPr eaLnBrk="1" hangingPunct="1"/>
+            <a:endParaRPr lang="en-US" sz="2800" dirty="0">
+              <a:latin typeface="Calibri" pitchFamily="34" charset="0"/>
+            </a:endParaRPr>
+          </a:p>
+          <a:p>
+            <a:pPr eaLnBrk="1" hangingPunct="1"/>
             <a:endParaRPr lang="en-US" sz="2800" dirty="0" smtClean="0">
               <a:latin typeface="Calibri" pitchFamily="34" charset="0"/>
             </a:endParaRPr>
@@ -4645,12 +4750,6 @@
           </a:p>
           <a:p>
             <a:pPr eaLnBrk="1" hangingPunct="1"/>
-            <a:endParaRPr lang="en-US" sz="2800" dirty="0">
-              <a:latin typeface="Calibri" pitchFamily="34" charset="0"/>
-            </a:endParaRPr>
-          </a:p>
-          <a:p>
-            <a:pPr eaLnBrk="1" hangingPunct="1"/>
             <a:endParaRPr lang="en-US" sz="2800" dirty="0" smtClean="0">
               <a:latin typeface="Calibri" pitchFamily="34" charset="0"/>
             </a:endParaRPr>
@@ -4658,12 +4757,6 @@
           <a:p>
             <a:pPr eaLnBrk="1" hangingPunct="1"/>
             <a:endParaRPr lang="en-US" sz="2800" dirty="0">
-              <a:latin typeface="Calibri" pitchFamily="34" charset="0"/>
-            </a:endParaRPr>
-          </a:p>
-          <a:p>
-            <a:pPr eaLnBrk="1" hangingPunct="1"/>
-            <a:endParaRPr lang="en-US" sz="2800" dirty="0" smtClean="0">
               <a:latin typeface="Calibri" pitchFamily="34" charset="0"/>
             </a:endParaRPr>
           </a:p>
@@ -4767,7 +4860,7 @@
         </p:nvSpPr>
         <p:spPr bwMode="auto">
           <a:xfrm>
-            <a:off x="1280160" y="11658602"/>
+            <a:off x="1280160" y="11506202"/>
             <a:ext cx="9692640" cy="6740260"/>
           </a:xfrm>
           <a:prstGeom prst="rect">
@@ -5150,7 +5243,7 @@
         </p:nvSpPr>
         <p:spPr bwMode="auto">
           <a:xfrm>
-            <a:off x="1263537" y="19659600"/>
+            <a:off x="1263537" y="19192783"/>
             <a:ext cx="9692640" cy="8772617"/>
           </a:xfrm>
           <a:prstGeom prst="rect">
@@ -5577,7 +5670,7 @@
         </p:nvSpPr>
         <p:spPr>
           <a:xfrm>
-            <a:off x="1263537" y="18973800"/>
+            <a:off x="1263537" y="18506983"/>
             <a:ext cx="9692640" cy="685800"/>
           </a:xfrm>
           <a:prstGeom prst="rect">
@@ -7023,8 +7116,8 @@
         </p:nvSpPr>
         <p:spPr>
           <a:xfrm>
-            <a:off x="27889200" y="31735693"/>
-            <a:ext cx="5029200" cy="954107"/>
+            <a:off x="26865878" y="31461681"/>
+            <a:ext cx="5558589" cy="1200329"/>
           </a:xfrm>
           <a:prstGeom prst="rect">
             <a:avLst/>
@@ -7038,27 +7131,27 @@
           <a:lstStyle/>
           <a:p>
             <a:r>
-              <a:rPr lang="en-US" sz="1400" dirty="0" smtClean="0"/>
+              <a:rPr lang="en-US" sz="1800" dirty="0" smtClean="0"/>
               <a:t>Graphs generated from TensorFlow and </a:t>
             </a:r>
             <a:r>
-              <a:rPr lang="en-US" sz="1400" dirty="0"/>
+              <a:rPr lang="en-US" sz="1800" dirty="0"/>
               <a:t>J</a:t>
             </a:r>
             <a:r>
-              <a:rPr lang="en-US" sz="1400" dirty="0" smtClean="0"/>
+              <a:rPr lang="en-US" sz="1800" dirty="0" smtClean="0"/>
               <a:t>uptyer Notebook models created by this team</a:t>
             </a:r>
           </a:p>
           <a:p>
-            <a:endParaRPr lang="en-US" sz="1400" dirty="0"/>
-          </a:p>
-          <a:p>
-            <a:r>
-              <a:rPr lang="en-US" sz="1400" dirty="0" smtClean="0"/>
+            <a:endParaRPr lang="en-US" sz="1800" dirty="0"/>
+          </a:p>
+          <a:p>
+            <a:r>
+              <a:rPr lang="en-US" sz="1800" dirty="0" smtClean="0"/>
               <a:t>* Logistic regression model data not currently available</a:t>
             </a:r>
-            <a:endParaRPr lang="en-US" sz="1400" dirty="0"/>
+            <a:endParaRPr lang="en-US" sz="1800" dirty="0"/>
           </a:p>
         </p:txBody>
       </p:sp>
@@ -8741,7 +8834,7 @@
         </p:blipFill>
         <p:spPr>
           <a:xfrm>
-            <a:off x="22196859" y="8001000"/>
+            <a:off x="22196859" y="7412987"/>
             <a:ext cx="5006541" cy="3754906"/>
           </a:xfrm>
           <a:prstGeom prst="rect">
@@ -8759,7 +8852,7 @@
         </p:nvSpPr>
         <p:spPr bwMode="auto">
           <a:xfrm>
-            <a:off x="22702236" y="11763445"/>
+            <a:off x="22702236" y="11175432"/>
             <a:ext cx="5872764" cy="715568"/>
           </a:xfrm>
           <a:prstGeom prst="rect">
@@ -8935,7 +9028,7 @@
         </p:nvSpPr>
         <p:spPr>
           <a:xfrm>
-            <a:off x="23926800" y="8080011"/>
+            <a:off x="23926800" y="7491998"/>
             <a:ext cx="2133600" cy="338554"/>
           </a:xfrm>
           <a:prstGeom prst="rect">
@@ -8986,7 +9079,7 @@
         </p:blipFill>
         <p:spPr>
           <a:xfrm>
-            <a:off x="22196858" y="12518966"/>
+            <a:off x="22196858" y="11930953"/>
             <a:ext cx="5120639" cy="3840480"/>
           </a:xfrm>
           <a:prstGeom prst="rect">
@@ -9004,7 +9097,7 @@
         </p:nvSpPr>
         <p:spPr bwMode="auto">
           <a:xfrm>
-            <a:off x="22702236" y="16359446"/>
+            <a:off x="22702236" y="15771433"/>
             <a:ext cx="5872764" cy="992567"/>
           </a:xfrm>
           <a:prstGeom prst="rect">

</xml_diff>